<commit_message>
add schema for mobile version
</commit_message>
<xml_diff>
--- a/Schéma de passage.pptx
+++ b/Schéma de passage.pptx
@@ -5,14 +5,17 @@
     <p:sldMasterId id="2147483648" r:id="rId4"/>
   </p:sldMasterIdLst>
   <p:notesMasterIdLst>
-    <p:notesMasterId r:id="rId7"/>
+    <p:notesMasterId r:id="rId10"/>
   </p:notesMasterIdLst>
   <p:handoutMasterIdLst>
-    <p:handoutMasterId r:id="rId8"/>
+    <p:handoutMasterId r:id="rId11"/>
   </p:handoutMasterIdLst>
   <p:sldIdLst>
     <p:sldId id="444" r:id="rId5"/>
     <p:sldId id="445" r:id="rId6"/>
+    <p:sldId id="446" r:id="rId7"/>
+    <p:sldId id="448" r:id="rId8"/>
+    <p:sldId id="447" r:id="rId9"/>
   </p:sldIdLst>
   <p:sldSz cx="12188825" cy="6858000"/>
   <p:notesSz cx="6858000" cy="9144000"/>
@@ -836,6 +839,261 @@
     <p:extLst>
       <p:ext uri="{BB962C8B-B14F-4D97-AF65-F5344CB8AC3E}">
         <p14:creationId xmlns:p14="http://schemas.microsoft.com/office/powerpoint/2010/main" val="3215322240"/>
+      </p:ext>
+    </p:extLst>
+  </p:cSld>
+  <p:clrMapOvr>
+    <a:masterClrMapping/>
+  </p:clrMapOvr>
+</p:notes>
+</file>
+
+<file path=ppt/notesSlides/notesSlide3.xml><?xml version="1.0" encoding="utf-8"?>
+<p:notes xmlns:a="http://schemas.openxmlformats.org/drawingml/2006/main" xmlns:r="http://schemas.openxmlformats.org/officeDocument/2006/relationships" xmlns:p="http://schemas.openxmlformats.org/presentationml/2006/main">
+  <p:cSld>
+    <p:spTree>
+      <p:nvGrpSpPr>
+        <p:cNvPr id="1" name=""/>
+        <p:cNvGrpSpPr/>
+        <p:nvPr/>
+      </p:nvGrpSpPr>
+      <p:grpSpPr>
+        <a:xfrm>
+          <a:off x="0" y="0"/>
+          <a:ext cx="0" cy="0"/>
+          <a:chOff x="0" y="0"/>
+          <a:chExt cx="0" cy="0"/>
+        </a:xfrm>
+      </p:grpSpPr>
+      <p:sp>
+        <p:nvSpPr>
+          <p:cNvPr id="2" name="Slide Image Placeholder 1"/>
+          <p:cNvSpPr>
+            <a:spLocks noGrp="1" noRot="1" noChangeAspect="1"/>
+          </p:cNvSpPr>
+          <p:nvPr>
+            <p:ph type="sldImg"/>
+          </p:nvPr>
+        </p:nvSpPr>
+        <p:spPr/>
+      </p:sp>
+      <p:sp>
+        <p:nvSpPr>
+          <p:cNvPr id="3" name="Notes Placeholder 2"/>
+          <p:cNvSpPr>
+            <a:spLocks noGrp="1"/>
+          </p:cNvSpPr>
+          <p:nvPr>
+            <p:ph type="body" idx="1"/>
+          </p:nvPr>
+        </p:nvSpPr>
+        <p:spPr/>
+        <p:txBody>
+          <a:bodyPr/>
+          <a:lstStyle/>
+          <a:p>
+            <a:endParaRPr lang="en-US" dirty="0"/>
+          </a:p>
+        </p:txBody>
+      </p:sp>
+      <p:sp>
+        <p:nvSpPr>
+          <p:cNvPr id="4" name="Slide Number Placeholder 3"/>
+          <p:cNvSpPr>
+            <a:spLocks noGrp="1"/>
+          </p:cNvSpPr>
+          <p:nvPr>
+            <p:ph type="sldNum" sz="quarter" idx="10"/>
+          </p:nvPr>
+        </p:nvSpPr>
+        <p:spPr/>
+        <p:txBody>
+          <a:bodyPr/>
+          <a:lstStyle/>
+          <a:p>
+            <a:fld id="{B0FCC8D5-6D68-A443-97C0-91AE5977134B}" type="slidenum">
+              <a:rPr lang="en-US" smtClean="0"/>
+              <a:pPr/>
+              <a:t>3</a:t>
+            </a:fld>
+            <a:endParaRPr lang="en-US" dirty="0"/>
+          </a:p>
+        </p:txBody>
+      </p:sp>
+    </p:spTree>
+    <p:extLst>
+      <p:ext uri="{BB962C8B-B14F-4D97-AF65-F5344CB8AC3E}">
+        <p14:creationId xmlns:p14="http://schemas.microsoft.com/office/powerpoint/2010/main" val="256826194"/>
+      </p:ext>
+    </p:extLst>
+  </p:cSld>
+  <p:clrMapOvr>
+    <a:masterClrMapping/>
+  </p:clrMapOvr>
+</p:notes>
+</file>
+
+<file path=ppt/notesSlides/notesSlide4.xml><?xml version="1.0" encoding="utf-8"?>
+<p:notes xmlns:a="http://schemas.openxmlformats.org/drawingml/2006/main" xmlns:r="http://schemas.openxmlformats.org/officeDocument/2006/relationships" xmlns:p="http://schemas.openxmlformats.org/presentationml/2006/main">
+  <p:cSld>
+    <p:spTree>
+      <p:nvGrpSpPr>
+        <p:cNvPr id="1" name=""/>
+        <p:cNvGrpSpPr/>
+        <p:nvPr/>
+      </p:nvGrpSpPr>
+      <p:grpSpPr>
+        <a:xfrm>
+          <a:off x="0" y="0"/>
+          <a:ext cx="0" cy="0"/>
+          <a:chOff x="0" y="0"/>
+          <a:chExt cx="0" cy="0"/>
+        </a:xfrm>
+      </p:grpSpPr>
+      <p:sp>
+        <p:nvSpPr>
+          <p:cNvPr id="2" name="Slide Image Placeholder 1"/>
+          <p:cNvSpPr>
+            <a:spLocks noGrp="1" noRot="1" noChangeAspect="1"/>
+          </p:cNvSpPr>
+          <p:nvPr>
+            <p:ph type="sldImg"/>
+          </p:nvPr>
+        </p:nvSpPr>
+        <p:spPr/>
+      </p:sp>
+      <p:sp>
+        <p:nvSpPr>
+          <p:cNvPr id="3" name="Notes Placeholder 2"/>
+          <p:cNvSpPr>
+            <a:spLocks noGrp="1"/>
+          </p:cNvSpPr>
+          <p:nvPr>
+            <p:ph type="body" idx="1"/>
+          </p:nvPr>
+        </p:nvSpPr>
+        <p:spPr/>
+        <p:txBody>
+          <a:bodyPr/>
+          <a:lstStyle/>
+          <a:p>
+            <a:endParaRPr lang="en-US" dirty="0"/>
+          </a:p>
+        </p:txBody>
+      </p:sp>
+      <p:sp>
+        <p:nvSpPr>
+          <p:cNvPr id="4" name="Slide Number Placeholder 3"/>
+          <p:cNvSpPr>
+            <a:spLocks noGrp="1"/>
+          </p:cNvSpPr>
+          <p:nvPr>
+            <p:ph type="sldNum" sz="quarter" idx="10"/>
+          </p:nvPr>
+        </p:nvSpPr>
+        <p:spPr/>
+        <p:txBody>
+          <a:bodyPr/>
+          <a:lstStyle/>
+          <a:p>
+            <a:fld id="{B0FCC8D5-6D68-A443-97C0-91AE5977134B}" type="slidenum">
+              <a:rPr lang="en-US" smtClean="0"/>
+              <a:pPr/>
+              <a:t>4</a:t>
+            </a:fld>
+            <a:endParaRPr lang="en-US" dirty="0"/>
+          </a:p>
+        </p:txBody>
+      </p:sp>
+    </p:spTree>
+    <p:extLst>
+      <p:ext uri="{BB962C8B-B14F-4D97-AF65-F5344CB8AC3E}">
+        <p14:creationId xmlns:p14="http://schemas.microsoft.com/office/powerpoint/2010/main" val="2198301531"/>
+      </p:ext>
+    </p:extLst>
+  </p:cSld>
+  <p:clrMapOvr>
+    <a:masterClrMapping/>
+  </p:clrMapOvr>
+</p:notes>
+</file>
+
+<file path=ppt/notesSlides/notesSlide5.xml><?xml version="1.0" encoding="utf-8"?>
+<p:notes xmlns:a="http://schemas.openxmlformats.org/drawingml/2006/main" xmlns:r="http://schemas.openxmlformats.org/officeDocument/2006/relationships" xmlns:p="http://schemas.openxmlformats.org/presentationml/2006/main">
+  <p:cSld>
+    <p:spTree>
+      <p:nvGrpSpPr>
+        <p:cNvPr id="1" name=""/>
+        <p:cNvGrpSpPr/>
+        <p:nvPr/>
+      </p:nvGrpSpPr>
+      <p:grpSpPr>
+        <a:xfrm>
+          <a:off x="0" y="0"/>
+          <a:ext cx="0" cy="0"/>
+          <a:chOff x="0" y="0"/>
+          <a:chExt cx="0" cy="0"/>
+        </a:xfrm>
+      </p:grpSpPr>
+      <p:sp>
+        <p:nvSpPr>
+          <p:cNvPr id="2" name="Slide Image Placeholder 1"/>
+          <p:cNvSpPr>
+            <a:spLocks noGrp="1" noRot="1" noChangeAspect="1"/>
+          </p:cNvSpPr>
+          <p:nvPr>
+            <p:ph type="sldImg"/>
+          </p:nvPr>
+        </p:nvSpPr>
+        <p:spPr/>
+      </p:sp>
+      <p:sp>
+        <p:nvSpPr>
+          <p:cNvPr id="3" name="Notes Placeholder 2"/>
+          <p:cNvSpPr>
+            <a:spLocks noGrp="1"/>
+          </p:cNvSpPr>
+          <p:nvPr>
+            <p:ph type="body" idx="1"/>
+          </p:nvPr>
+        </p:nvSpPr>
+        <p:spPr/>
+        <p:txBody>
+          <a:bodyPr/>
+          <a:lstStyle/>
+          <a:p>
+            <a:endParaRPr lang="en-US" dirty="0"/>
+          </a:p>
+        </p:txBody>
+      </p:sp>
+      <p:sp>
+        <p:nvSpPr>
+          <p:cNvPr id="4" name="Slide Number Placeholder 3"/>
+          <p:cNvSpPr>
+            <a:spLocks noGrp="1"/>
+          </p:cNvSpPr>
+          <p:nvPr>
+            <p:ph type="sldNum" sz="quarter" idx="10"/>
+          </p:nvPr>
+        </p:nvSpPr>
+        <p:spPr/>
+        <p:txBody>
+          <a:bodyPr/>
+          <a:lstStyle/>
+          <a:p>
+            <a:fld id="{B0FCC8D5-6D68-A443-97C0-91AE5977134B}" type="slidenum">
+              <a:rPr lang="en-US" smtClean="0"/>
+              <a:pPr/>
+              <a:t>5</a:t>
+            </a:fld>
+            <a:endParaRPr lang="en-US" dirty="0"/>
+          </a:p>
+        </p:txBody>
+      </p:sp>
+    </p:spTree>
+    <p:extLst>
+      <p:ext uri="{BB962C8B-B14F-4D97-AF65-F5344CB8AC3E}">
+        <p14:creationId xmlns:p14="http://schemas.microsoft.com/office/powerpoint/2010/main" val="687282724"/>
       </p:ext>
     </p:extLst>
   </p:cSld>
@@ -8179,6 +8437,642 @@
     <p:extLst>
       <p:ext uri="{BB962C8B-B14F-4D97-AF65-F5344CB8AC3E}">
         <p14:creationId xmlns:p14="http://schemas.microsoft.com/office/powerpoint/2010/main" val="3042315390"/>
+      </p:ext>
+    </p:extLst>
+  </p:cSld>
+  <p:clrMapOvr>
+    <a:masterClrMapping/>
+  </p:clrMapOvr>
+</p:sld>
+</file>
+
+<file path=ppt/slides/slide3.xml><?xml version="1.0" encoding="utf-8"?>
+<p:sld xmlns:a="http://schemas.openxmlformats.org/drawingml/2006/main" xmlns:r="http://schemas.openxmlformats.org/officeDocument/2006/relationships" xmlns:p="http://schemas.openxmlformats.org/presentationml/2006/main">
+  <p:cSld>
+    <p:spTree>
+      <p:nvGrpSpPr>
+        <p:cNvPr id="1" name=""/>
+        <p:cNvGrpSpPr/>
+        <p:nvPr/>
+      </p:nvGrpSpPr>
+      <p:grpSpPr>
+        <a:xfrm>
+          <a:off x="0" y="0"/>
+          <a:ext cx="0" cy="0"/>
+          <a:chOff x="0" y="0"/>
+          <a:chExt cx="0" cy="0"/>
+        </a:xfrm>
+      </p:grpSpPr>
+      <p:sp>
+        <p:nvSpPr>
+          <p:cNvPr id="7" name="Title 6" hidden="1"/>
+          <p:cNvSpPr>
+            <a:spLocks noGrp="1"/>
+          </p:cNvSpPr>
+          <p:nvPr>
+            <p:ph type="title"/>
+          </p:nvPr>
+        </p:nvSpPr>
+        <p:spPr/>
+        <p:txBody>
+          <a:bodyPr/>
+          <a:lstStyle/>
+          <a:p>
+            <a:r>
+              <a:rPr lang="en-US" dirty="0">
+                <a:latin typeface="DIN Alternate" charset="0"/>
+                <a:ea typeface="DIN Alternate" charset="0"/>
+                <a:cs typeface="DIN Alternate" charset="0"/>
+              </a:rPr>
+              <a:t>Tips &amp; Tricks (PC and Mac)</a:t>
+            </a:r>
+          </a:p>
+        </p:txBody>
+      </p:sp>
+      <p:sp>
+        <p:nvSpPr>
+          <p:cNvPr id="2" name="Rectangle 1">
+            <a:extLst>
+              <a:ext uri="{C183D7F6-B498-43B3-948B-1728B52AA6E4}">
+                <adec:decorative xmlns:adec="http://schemas.microsoft.com/office/drawing/2017/decorative" val="1"/>
+              </a:ext>
+            </a:extLst>
+          </p:cNvPr>
+          <p:cNvSpPr/>
+          <p:nvPr/>
+        </p:nvSpPr>
+        <p:spPr bwMode="auto">
+          <a:xfrm>
+            <a:off x="0" y="0"/>
+            <a:ext cx="12188825" cy="6858000"/>
+          </a:xfrm>
+          <a:prstGeom prst="rect">
+            <a:avLst/>
+          </a:prstGeom>
+          <a:solidFill>
+            <a:srgbClr val="E4E4E4"/>
+          </a:solidFill>
+          <a:ln w="9525" cap="flat" cmpd="sng" algn="ctr">
+            <a:noFill/>
+            <a:prstDash val="solid"/>
+            <a:round/>
+            <a:headEnd type="none" w="med" len="med"/>
+            <a:tailEnd type="none" w="med" len="med"/>
+          </a:ln>
+          <a:effectLst/>
+        </p:spPr>
+        <p:txBody>
+          <a:bodyPr vert="horz" wrap="square" lIns="91440" tIns="45720" rIns="91440" bIns="45720" numCol="1" rtlCol="0" anchor="t" anchorCtr="0" compatLnSpc="1">
+            <a:prstTxWarp prst="textNoShape">
+              <a:avLst/>
+            </a:prstTxWarp>
+          </a:bodyPr>
+          <a:lstStyle/>
+          <a:p>
+            <a:pPr marL="0" marR="0" indent="0" algn="l" defTabSz="914400" rtl="0" eaLnBrk="0" fontAlgn="base" latinLnBrk="0" hangingPunct="0">
+              <a:lnSpc>
+                <a:spcPct val="100000"/>
+              </a:lnSpc>
+              <a:spcBef>
+                <a:spcPct val="0"/>
+              </a:spcBef>
+              <a:spcAft>
+                <a:spcPct val="0"/>
+              </a:spcAft>
+              <a:buClrTx/>
+              <a:buSzTx/>
+              <a:buFontTx/>
+              <a:buNone/>
+              <a:tabLst/>
+            </a:pPr>
+            <a:endParaRPr kumimoji="0" lang="en-US" sz="2400" b="0" i="0" u="none" strike="noStrike" cap="none" normalizeH="0" baseline="0" dirty="0">
+              <a:ln>
+                <a:noFill/>
+              </a:ln>
+              <a:solidFill>
+                <a:schemeClr val="tx1"/>
+              </a:solidFill>
+              <a:effectLst/>
+              <a:latin typeface="Times"/>
+            </a:endParaRPr>
+          </a:p>
+        </p:txBody>
+      </p:sp>
+      <p:sp>
+        <p:nvSpPr>
+          <p:cNvPr id="4" name="Rectangle 3">
+            <a:extLst>
+              <a:ext uri="{C183D7F6-B498-43B3-948B-1728B52AA6E4}">
+                <adec:decorative xmlns:adec="http://schemas.microsoft.com/office/drawing/2017/decorative" val="0"/>
+              </a:ext>
+            </a:extLst>
+          </p:cNvPr>
+          <p:cNvSpPr/>
+          <p:nvPr/>
+        </p:nvSpPr>
+        <p:spPr>
+          <a:xfrm>
+            <a:off x="74612" y="0"/>
+            <a:ext cx="11911460" cy="584775"/>
+          </a:xfrm>
+          <a:prstGeom prst="rect">
+            <a:avLst/>
+          </a:prstGeom>
+        </p:spPr>
+        <p:txBody>
+          <a:bodyPr wrap="square">
+            <a:spAutoFit/>
+          </a:bodyPr>
+          <a:lstStyle/>
+          <a:p>
+            <a:r>
+              <a:rPr lang="fr-FR" sz="3200" cap="all" dirty="0">
+                <a:solidFill>
+                  <a:schemeClr val="tx1">
+                    <a:lumMod val="65000"/>
+                    <a:lumOff val="35000"/>
+                  </a:schemeClr>
+                </a:solidFill>
+                <a:latin typeface="DIN Alternate"/>
+              </a:rPr>
+              <a:t>schéma de passage entre les pages </a:t>
+            </a:r>
+            <a:r>
+              <a:rPr lang="en-US" dirty="0">
+                <a:solidFill>
+                  <a:schemeClr val="tx1">
+                    <a:lumMod val="85000"/>
+                    <a:lumOff val="15000"/>
+                  </a:schemeClr>
+                </a:solidFill>
+                <a:latin typeface="DIN Alternate" charset="0"/>
+                <a:ea typeface="DIN Alternate" charset="0"/>
+                <a:cs typeface="DIN Alternate" charset="0"/>
+              </a:rPr>
+              <a:t>(pour le desktop avec Adobe XD)</a:t>
+            </a:r>
+          </a:p>
+        </p:txBody>
+      </p:sp>
+      <p:pic>
+        <p:nvPicPr>
+          <p:cNvPr id="5" name="Picture 4">
+            <a:extLst>
+              <a:ext uri="{FF2B5EF4-FFF2-40B4-BE49-F238E27FC236}">
+                <a16:creationId xmlns:a16="http://schemas.microsoft.com/office/drawing/2014/main" id="{EB682767-F495-45F4-97ED-1B9743C70528}"/>
+              </a:ext>
+            </a:extLst>
+          </p:cNvPr>
+          <p:cNvPicPr>
+            <a:picLocks noChangeAspect="1"/>
+          </p:cNvPicPr>
+          <p:nvPr/>
+        </p:nvPicPr>
+        <p:blipFill>
+          <a:blip r:embed="rId3"/>
+          <a:stretch>
+            <a:fillRect/>
+          </a:stretch>
+        </p:blipFill>
+        <p:spPr>
+          <a:xfrm>
+            <a:off x="1522706" y="530208"/>
+            <a:ext cx="9143411" cy="6309603"/>
+          </a:xfrm>
+          <a:prstGeom prst="rect">
+            <a:avLst/>
+          </a:prstGeom>
+        </p:spPr>
+      </p:pic>
+    </p:spTree>
+    <p:extLst>
+      <p:ext uri="{BB962C8B-B14F-4D97-AF65-F5344CB8AC3E}">
+        <p14:creationId xmlns:p14="http://schemas.microsoft.com/office/powerpoint/2010/main" val="1507090099"/>
+      </p:ext>
+    </p:extLst>
+  </p:cSld>
+  <p:clrMapOvr>
+    <a:masterClrMapping/>
+  </p:clrMapOvr>
+</p:sld>
+</file>
+
+<file path=ppt/slides/slide4.xml><?xml version="1.0" encoding="utf-8"?>
+<p:sld xmlns:a="http://schemas.openxmlformats.org/drawingml/2006/main" xmlns:r="http://schemas.openxmlformats.org/officeDocument/2006/relationships" xmlns:p="http://schemas.openxmlformats.org/presentationml/2006/main">
+  <p:cSld>
+    <p:spTree>
+      <p:nvGrpSpPr>
+        <p:cNvPr id="1" name=""/>
+        <p:cNvGrpSpPr/>
+        <p:nvPr/>
+      </p:nvGrpSpPr>
+      <p:grpSpPr>
+        <a:xfrm>
+          <a:off x="0" y="0"/>
+          <a:ext cx="0" cy="0"/>
+          <a:chOff x="0" y="0"/>
+          <a:chExt cx="0" cy="0"/>
+        </a:xfrm>
+      </p:grpSpPr>
+      <p:sp>
+        <p:nvSpPr>
+          <p:cNvPr id="7" name="Title 6" hidden="1"/>
+          <p:cNvSpPr>
+            <a:spLocks noGrp="1"/>
+          </p:cNvSpPr>
+          <p:nvPr>
+            <p:ph type="title"/>
+          </p:nvPr>
+        </p:nvSpPr>
+        <p:spPr/>
+        <p:txBody>
+          <a:bodyPr/>
+          <a:lstStyle/>
+          <a:p>
+            <a:r>
+              <a:rPr lang="en-US" dirty="0">
+                <a:latin typeface="DIN Alternate" charset="0"/>
+                <a:ea typeface="DIN Alternate" charset="0"/>
+                <a:cs typeface="DIN Alternate" charset="0"/>
+              </a:rPr>
+              <a:t>Tips &amp; Tricks (PC and Mac)</a:t>
+            </a:r>
+          </a:p>
+        </p:txBody>
+      </p:sp>
+      <p:sp>
+        <p:nvSpPr>
+          <p:cNvPr id="2" name="Rectangle 1">
+            <a:extLst>
+              <a:ext uri="{C183D7F6-B498-43B3-948B-1728B52AA6E4}">
+                <adec:decorative xmlns:adec="http://schemas.microsoft.com/office/drawing/2017/decorative" val="1"/>
+              </a:ext>
+            </a:extLst>
+          </p:cNvPr>
+          <p:cNvSpPr/>
+          <p:nvPr/>
+        </p:nvSpPr>
+        <p:spPr bwMode="auto">
+          <a:xfrm>
+            <a:off x="0" y="0"/>
+            <a:ext cx="12188825" cy="6858000"/>
+          </a:xfrm>
+          <a:prstGeom prst="rect">
+            <a:avLst/>
+          </a:prstGeom>
+          <a:gradFill flip="none" rotWithShape="1">
+            <a:gsLst>
+              <a:gs pos="19000">
+                <a:srgbClr val="404040"/>
+              </a:gs>
+              <a:gs pos="100000">
+                <a:srgbClr val="535353"/>
+              </a:gs>
+            </a:gsLst>
+            <a:lin ang="5400000" scaled="0"/>
+            <a:tileRect/>
+          </a:gradFill>
+          <a:ln w="9525" cap="flat" cmpd="sng" algn="ctr">
+            <a:noFill/>
+            <a:prstDash val="solid"/>
+            <a:round/>
+            <a:headEnd type="none" w="med" len="med"/>
+            <a:tailEnd type="none" w="med" len="med"/>
+          </a:ln>
+          <a:effectLst/>
+        </p:spPr>
+        <p:txBody>
+          <a:bodyPr vert="horz" wrap="square" lIns="91440" tIns="45720" rIns="91440" bIns="45720" numCol="1" rtlCol="0" anchor="t" anchorCtr="0" compatLnSpc="1">
+            <a:prstTxWarp prst="textNoShape">
+              <a:avLst/>
+            </a:prstTxWarp>
+          </a:bodyPr>
+          <a:lstStyle/>
+          <a:p>
+            <a:pPr marL="0" marR="0" indent="0" algn="l" defTabSz="914400" rtl="0" eaLnBrk="0" fontAlgn="base" latinLnBrk="0" hangingPunct="0">
+              <a:lnSpc>
+                <a:spcPct val="100000"/>
+              </a:lnSpc>
+              <a:spcBef>
+                <a:spcPct val="0"/>
+              </a:spcBef>
+              <a:spcAft>
+                <a:spcPct val="0"/>
+              </a:spcAft>
+              <a:buClrTx/>
+              <a:buSzTx/>
+              <a:buFontTx/>
+              <a:buNone/>
+              <a:tabLst/>
+            </a:pPr>
+            <a:endParaRPr kumimoji="0" lang="en-US" sz="2400" b="0" i="0" u="none" strike="noStrike" cap="none" normalizeH="0" baseline="0" dirty="0">
+              <a:ln>
+                <a:noFill/>
+              </a:ln>
+              <a:solidFill>
+                <a:schemeClr val="tx1"/>
+              </a:solidFill>
+              <a:effectLst/>
+              <a:latin typeface="Times"/>
+            </a:endParaRPr>
+          </a:p>
+        </p:txBody>
+      </p:sp>
+      <p:sp>
+        <p:nvSpPr>
+          <p:cNvPr id="4" name="Rectangle 3">
+            <a:extLst>
+              <a:ext uri="{C183D7F6-B498-43B3-948B-1728B52AA6E4}">
+                <adec:decorative xmlns:adec="http://schemas.microsoft.com/office/drawing/2017/decorative" val="0"/>
+              </a:ext>
+            </a:extLst>
+          </p:cNvPr>
+          <p:cNvSpPr/>
+          <p:nvPr/>
+        </p:nvSpPr>
+        <p:spPr>
+          <a:xfrm>
+            <a:off x="74612" y="0"/>
+            <a:ext cx="11911460" cy="584775"/>
+          </a:xfrm>
+          <a:prstGeom prst="rect">
+            <a:avLst/>
+          </a:prstGeom>
+        </p:spPr>
+        <p:txBody>
+          <a:bodyPr wrap="square">
+            <a:spAutoFit/>
+          </a:bodyPr>
+          <a:lstStyle/>
+          <a:p>
+            <a:r>
+              <a:rPr lang="fr-FR" sz="3200" cap="all" dirty="0">
+                <a:solidFill>
+                  <a:schemeClr val="bg1"/>
+                </a:solidFill>
+                <a:latin typeface="DIN Alternate"/>
+              </a:rPr>
+              <a:t>schéma de passage entre les pages </a:t>
+            </a:r>
+            <a:r>
+              <a:rPr lang="en-US" dirty="0">
+                <a:solidFill>
+                  <a:srgbClr val="A3A3A3"/>
+                </a:solidFill>
+                <a:latin typeface="DIN Alternate" charset="0"/>
+                <a:ea typeface="DIN Alternate" charset="0"/>
+                <a:cs typeface="DIN Alternate" charset="0"/>
+              </a:rPr>
+              <a:t>(pour le mobile)</a:t>
+            </a:r>
+          </a:p>
+        </p:txBody>
+      </p:sp>
+      <p:pic>
+        <p:nvPicPr>
+          <p:cNvPr id="5" name="Picture 4">
+            <a:extLst>
+              <a:ext uri="{FF2B5EF4-FFF2-40B4-BE49-F238E27FC236}">
+                <a16:creationId xmlns:a16="http://schemas.microsoft.com/office/drawing/2014/main" id="{F47F9EA0-B4A3-408D-BECE-7E574EB7F42E}"/>
+              </a:ext>
+            </a:extLst>
+          </p:cNvPr>
+          <p:cNvPicPr>
+            <a:picLocks noChangeAspect="1"/>
+          </p:cNvPicPr>
+          <p:nvPr/>
+        </p:nvPicPr>
+        <p:blipFill>
+          <a:blip r:embed="rId3"/>
+          <a:stretch>
+            <a:fillRect/>
+          </a:stretch>
+        </p:blipFill>
+        <p:spPr>
+          <a:xfrm>
+            <a:off x="967883" y="533400"/>
+            <a:ext cx="10124917" cy="6257801"/>
+          </a:xfrm>
+          <a:prstGeom prst="rect">
+            <a:avLst/>
+          </a:prstGeom>
+        </p:spPr>
+      </p:pic>
+    </p:spTree>
+    <p:extLst>
+      <p:ext uri="{BB962C8B-B14F-4D97-AF65-F5344CB8AC3E}">
+        <p14:creationId xmlns:p14="http://schemas.microsoft.com/office/powerpoint/2010/main" val="493133970"/>
+      </p:ext>
+    </p:extLst>
+  </p:cSld>
+  <p:clrMapOvr>
+    <a:masterClrMapping/>
+  </p:clrMapOvr>
+</p:sld>
+</file>
+
+<file path=ppt/slides/slide5.xml><?xml version="1.0" encoding="utf-8"?>
+<p:sld xmlns:a="http://schemas.openxmlformats.org/drawingml/2006/main" xmlns:r="http://schemas.openxmlformats.org/officeDocument/2006/relationships" xmlns:p="http://schemas.openxmlformats.org/presentationml/2006/main">
+  <p:cSld>
+    <p:spTree>
+      <p:nvGrpSpPr>
+        <p:cNvPr id="1" name=""/>
+        <p:cNvGrpSpPr/>
+        <p:nvPr/>
+      </p:nvGrpSpPr>
+      <p:grpSpPr>
+        <a:xfrm>
+          <a:off x="0" y="0"/>
+          <a:ext cx="0" cy="0"/>
+          <a:chOff x="0" y="0"/>
+          <a:chExt cx="0" cy="0"/>
+        </a:xfrm>
+      </p:grpSpPr>
+      <p:sp>
+        <p:nvSpPr>
+          <p:cNvPr id="7" name="Title 6" hidden="1"/>
+          <p:cNvSpPr>
+            <a:spLocks noGrp="1"/>
+          </p:cNvSpPr>
+          <p:nvPr>
+            <p:ph type="title"/>
+          </p:nvPr>
+        </p:nvSpPr>
+        <p:spPr/>
+        <p:txBody>
+          <a:bodyPr/>
+          <a:lstStyle/>
+          <a:p>
+            <a:r>
+              <a:rPr lang="en-US" dirty="0">
+                <a:latin typeface="DIN Alternate" charset="0"/>
+                <a:ea typeface="DIN Alternate" charset="0"/>
+                <a:cs typeface="DIN Alternate" charset="0"/>
+              </a:rPr>
+              <a:t>Tips &amp; Tricks (PC and Mac)</a:t>
+            </a:r>
+          </a:p>
+        </p:txBody>
+      </p:sp>
+      <p:sp>
+        <p:nvSpPr>
+          <p:cNvPr id="2" name="Rectangle 1">
+            <a:extLst>
+              <a:ext uri="{C183D7F6-B498-43B3-948B-1728B52AA6E4}">
+                <adec:decorative xmlns:adec="http://schemas.microsoft.com/office/drawing/2017/decorative" val="1"/>
+              </a:ext>
+            </a:extLst>
+          </p:cNvPr>
+          <p:cNvSpPr/>
+          <p:nvPr/>
+        </p:nvSpPr>
+        <p:spPr bwMode="auto">
+          <a:xfrm>
+            <a:off x="0" y="0"/>
+            <a:ext cx="12188825" cy="6858000"/>
+          </a:xfrm>
+          <a:prstGeom prst="rect">
+            <a:avLst/>
+          </a:prstGeom>
+          <a:solidFill>
+            <a:srgbClr val="E4E4E4"/>
+          </a:solidFill>
+          <a:ln w="9525" cap="flat" cmpd="sng" algn="ctr">
+            <a:noFill/>
+            <a:prstDash val="solid"/>
+            <a:round/>
+            <a:headEnd type="none" w="med" len="med"/>
+            <a:tailEnd type="none" w="med" len="med"/>
+          </a:ln>
+          <a:effectLst/>
+        </p:spPr>
+        <p:txBody>
+          <a:bodyPr vert="horz" wrap="square" lIns="91440" tIns="45720" rIns="91440" bIns="45720" numCol="1" rtlCol="0" anchor="t" anchorCtr="0" compatLnSpc="1">
+            <a:prstTxWarp prst="textNoShape">
+              <a:avLst/>
+            </a:prstTxWarp>
+          </a:bodyPr>
+          <a:lstStyle/>
+          <a:p>
+            <a:pPr marL="0" marR="0" indent="0" algn="l" defTabSz="914400" rtl="0" eaLnBrk="0" fontAlgn="base" latinLnBrk="0" hangingPunct="0">
+              <a:lnSpc>
+                <a:spcPct val="100000"/>
+              </a:lnSpc>
+              <a:spcBef>
+                <a:spcPct val="0"/>
+              </a:spcBef>
+              <a:spcAft>
+                <a:spcPct val="0"/>
+              </a:spcAft>
+              <a:buClrTx/>
+              <a:buSzTx/>
+              <a:buFontTx/>
+              <a:buNone/>
+              <a:tabLst/>
+            </a:pPr>
+            <a:endParaRPr kumimoji="0" lang="en-US" sz="2400" b="0" i="0" u="none" strike="noStrike" cap="none" normalizeH="0" baseline="0" dirty="0">
+              <a:ln>
+                <a:noFill/>
+              </a:ln>
+              <a:solidFill>
+                <a:schemeClr val="tx1"/>
+              </a:solidFill>
+              <a:effectLst/>
+              <a:latin typeface="Times"/>
+            </a:endParaRPr>
+          </a:p>
+        </p:txBody>
+      </p:sp>
+      <p:sp>
+        <p:nvSpPr>
+          <p:cNvPr id="4" name="Rectangle 3">
+            <a:extLst>
+              <a:ext uri="{C183D7F6-B498-43B3-948B-1728B52AA6E4}">
+                <adec:decorative xmlns:adec="http://schemas.microsoft.com/office/drawing/2017/decorative" val="0"/>
+              </a:ext>
+            </a:extLst>
+          </p:cNvPr>
+          <p:cNvSpPr/>
+          <p:nvPr/>
+        </p:nvSpPr>
+        <p:spPr>
+          <a:xfrm>
+            <a:off x="74612" y="0"/>
+            <a:ext cx="11911460" cy="584775"/>
+          </a:xfrm>
+          <a:prstGeom prst="rect">
+            <a:avLst/>
+          </a:prstGeom>
+        </p:spPr>
+        <p:txBody>
+          <a:bodyPr wrap="square">
+            <a:spAutoFit/>
+          </a:bodyPr>
+          <a:lstStyle/>
+          <a:p>
+            <a:r>
+              <a:rPr lang="fr-FR" sz="3200" cap="all" dirty="0">
+                <a:solidFill>
+                  <a:schemeClr val="tx1">
+                    <a:lumMod val="65000"/>
+                    <a:lumOff val="35000"/>
+                  </a:schemeClr>
+                </a:solidFill>
+                <a:latin typeface="DIN Alternate"/>
+              </a:rPr>
+              <a:t>schéma de passage entre les pages </a:t>
+            </a:r>
+            <a:r>
+              <a:rPr lang="en-US" dirty="0">
+                <a:solidFill>
+                  <a:schemeClr val="tx1">
+                    <a:lumMod val="85000"/>
+                    <a:lumOff val="15000"/>
+                  </a:schemeClr>
+                </a:solidFill>
+                <a:latin typeface="DIN Alternate" charset="0"/>
+                <a:ea typeface="DIN Alternate" charset="0"/>
+                <a:cs typeface="DIN Alternate" charset="0"/>
+              </a:rPr>
+              <a:t>(pour le mobile avec Adobe XD)</a:t>
+            </a:r>
+          </a:p>
+        </p:txBody>
+      </p:sp>
+      <p:pic>
+        <p:nvPicPr>
+          <p:cNvPr id="6" name="Picture 5">
+            <a:extLst>
+              <a:ext uri="{FF2B5EF4-FFF2-40B4-BE49-F238E27FC236}">
+                <a16:creationId xmlns:a16="http://schemas.microsoft.com/office/drawing/2014/main" id="{93875E1C-E387-408A-A22F-E569139BAFAC}"/>
+              </a:ext>
+            </a:extLst>
+          </p:cNvPr>
+          <p:cNvPicPr>
+            <a:picLocks noChangeAspect="1"/>
+          </p:cNvPicPr>
+          <p:nvPr/>
+        </p:nvPicPr>
+        <p:blipFill>
+          <a:blip r:embed="rId3"/>
+          <a:stretch>
+            <a:fillRect/>
+          </a:stretch>
+        </p:blipFill>
+        <p:spPr>
+          <a:xfrm>
+            <a:off x="1537486" y="584775"/>
+            <a:ext cx="8985712" cy="6178868"/>
+          </a:xfrm>
+          <a:prstGeom prst="rect">
+            <a:avLst/>
+          </a:prstGeom>
+        </p:spPr>
+      </p:pic>
+    </p:spTree>
+    <p:extLst>
+      <p:ext uri="{BB962C8B-B14F-4D97-AF65-F5344CB8AC3E}">
+        <p14:creationId xmlns:p14="http://schemas.microsoft.com/office/powerpoint/2010/main" val="2299840552"/>
       </p:ext>
     </p:extLst>
   </p:cSld>

</xml_diff>